<commit_message>
Changed v001 and uploaded
1st time repeating after editing
</commit_message>
<xml_diff>
--- a/ECE_PlaidTemplate_v001.pptx
+++ b/ECE_PlaidTemplate_v001.pptx
@@ -5,28 +5,29 @@
     <p:sldMasterId id="2147483669" r:id="rId1"/>
   </p:sldMasterIdLst>
   <p:notesMasterIdLst>
-    <p:notesMasterId r:id="rId4"/>
+    <p:notesMasterId r:id="rId5"/>
   </p:notesMasterIdLst>
   <p:sldIdLst>
     <p:sldId id="257" r:id="rId2"/>
     <p:sldId id="258" r:id="rId3"/>
+    <p:sldId id="259" r:id="rId4"/>
   </p:sldIdLst>
   <p:sldSz cx="12192000" cy="6858000"/>
   <p:notesSz cx="6858000" cy="9144000"/>
   <p:embeddedFontLst>
     <p:embeddedFont>
       <p:font typeface="Open Sans" panose="020B0606030504020204" pitchFamily="34" charset="0"/>
-      <p:regular r:id="rId5"/>
-      <p:bold r:id="rId6"/>
-      <p:italic r:id="rId7"/>
-      <p:boldItalic r:id="rId8"/>
+      <p:regular r:id="rId6"/>
+      <p:bold r:id="rId7"/>
+      <p:italic r:id="rId8"/>
+      <p:boldItalic r:id="rId9"/>
     </p:embeddedFont>
     <p:embeddedFont>
       <p:font typeface="Open Sans Light" panose="020B0306030504020204" pitchFamily="34" charset="0"/>
-      <p:regular r:id="rId9"/>
-      <p:bold r:id="rId10"/>
-      <p:italic r:id="rId11"/>
-      <p:boldItalic r:id="rId12"/>
+      <p:regular r:id="rId10"/>
+      <p:bold r:id="rId11"/>
+      <p:italic r:id="rId12"/>
+      <p:boldItalic r:id="rId13"/>
     </p:embeddedFont>
   </p:embeddedFontLst>
   <p:defaultTextStyle>
@@ -3287,6 +3288,127 @@
     <p:extLst>
       <p:ext uri="{BB962C8B-B14F-4D97-AF65-F5344CB8AC3E}">
         <p14:creationId xmlns:p14="http://schemas.microsoft.com/office/powerpoint/2010/main" val="1201654095"/>
+      </p:ext>
+    </p:extLst>
+  </p:cSld>
+  <p:clrMapOvr>
+    <a:masterClrMapping/>
+  </p:clrMapOvr>
+</p:sld>
+</file>
+
+<file path=ppt/slides/slide3.xml><?xml version="1.0" encoding="utf-8"?>
+<p:sld xmlns:a="http://schemas.openxmlformats.org/drawingml/2006/main" xmlns:r="http://schemas.openxmlformats.org/officeDocument/2006/relationships" xmlns:p="http://schemas.openxmlformats.org/presentationml/2006/main">
+  <p:cSld>
+    <p:spTree>
+      <p:nvGrpSpPr>
+        <p:cNvPr id="1" name=""/>
+        <p:cNvGrpSpPr/>
+        <p:nvPr/>
+      </p:nvGrpSpPr>
+      <p:grpSpPr>
+        <a:xfrm>
+          <a:off x="0" y="0"/>
+          <a:ext cx="0" cy="0"/>
+          <a:chOff x="0" y="0"/>
+          <a:chExt cx="0" cy="0"/>
+        </a:xfrm>
+      </p:grpSpPr>
+      <p:sp>
+        <p:nvSpPr>
+          <p:cNvPr id="2" name="Title 1">
+            <a:extLst>
+              <a:ext uri="{FF2B5EF4-FFF2-40B4-BE49-F238E27FC236}">
+                <a16:creationId xmlns:a16="http://schemas.microsoft.com/office/drawing/2014/main" id="{5DE04C27-122A-DB2E-CE70-FC0697565DC1}"/>
+              </a:ext>
+            </a:extLst>
+          </p:cNvPr>
+          <p:cNvSpPr>
+            <a:spLocks noGrp="1"/>
+          </p:cNvSpPr>
+          <p:nvPr>
+            <p:ph type="title"/>
+          </p:nvPr>
+        </p:nvSpPr>
+        <p:spPr/>
+        <p:txBody>
+          <a:bodyPr/>
+          <a:lstStyle/>
+          <a:p>
+            <a:r>
+              <a:rPr lang="en-US" dirty="0"/>
+              <a:t>Test</a:t>
+            </a:r>
+          </a:p>
+        </p:txBody>
+      </p:sp>
+      <p:sp>
+        <p:nvSpPr>
+          <p:cNvPr id="3" name="Slide Number Placeholder 2">
+            <a:extLst>
+              <a:ext uri="{FF2B5EF4-FFF2-40B4-BE49-F238E27FC236}">
+                <a16:creationId xmlns:a16="http://schemas.microsoft.com/office/drawing/2014/main" id="{36658C2E-7534-7867-9071-533BCA74A07F}"/>
+              </a:ext>
+            </a:extLst>
+          </p:cNvPr>
+          <p:cNvSpPr>
+            <a:spLocks noGrp="1"/>
+          </p:cNvSpPr>
+          <p:nvPr>
+            <p:ph type="sldNum" idx="10"/>
+          </p:nvPr>
+        </p:nvSpPr>
+        <p:spPr/>
+        <p:txBody>
+          <a:bodyPr/>
+          <a:lstStyle/>
+          <a:p>
+            <a:pPr marL="0" lvl="0" indent="0" algn="r" rtl="0">
+              <a:spcBef>
+                <a:spcPts val="0"/>
+              </a:spcBef>
+              <a:spcAft>
+                <a:spcPts val="0"/>
+              </a:spcAft>
+              <a:buNone/>
+            </a:pPr>
+            <a:fld id="{00000000-1234-1234-1234-123412341234}" type="slidenum">
+              <a:rPr lang="en-US" smtClean="0"/>
+              <a:t>3</a:t>
+            </a:fld>
+            <a:endParaRPr lang="en-US" dirty="0"/>
+          </a:p>
+        </p:txBody>
+      </p:sp>
+      <p:sp>
+        <p:nvSpPr>
+          <p:cNvPr id="4" name="Content Placeholder 3">
+            <a:extLst>
+              <a:ext uri="{FF2B5EF4-FFF2-40B4-BE49-F238E27FC236}">
+                <a16:creationId xmlns:a16="http://schemas.microsoft.com/office/drawing/2014/main" id="{EE3F2544-D66A-EE96-61B4-B0ED0CB189F6}"/>
+              </a:ext>
+            </a:extLst>
+          </p:cNvPr>
+          <p:cNvSpPr>
+            <a:spLocks noGrp="1"/>
+          </p:cNvSpPr>
+          <p:nvPr>
+            <p:ph idx="1"/>
+          </p:nvPr>
+        </p:nvSpPr>
+        <p:spPr/>
+        <p:txBody>
+          <a:bodyPr/>
+          <a:lstStyle/>
+          <a:p>
+            <a:endParaRPr lang="en-US" dirty="0"/>
+          </a:p>
+        </p:txBody>
+      </p:sp>
+    </p:spTree>
+    <p:extLst>
+      <p:ext uri="{BB962C8B-B14F-4D97-AF65-F5344CB8AC3E}">
+        <p14:creationId xmlns:p14="http://schemas.microsoft.com/office/powerpoint/2010/main" val="1494388447"/>
       </p:ext>
     </p:extLst>
   </p:cSld>

</xml_diff>